<commit_message>
Graphics lecture for Java
</commit_message>
<xml_diff>
--- a/OOP/lectures/080--Graphics.pptx
+++ b/OOP/lectures/080--Graphics.pptx
@@ -5,7 +5,7 @@
     <p:sldMasterId id="2147483648" r:id="rId1"/>
   </p:sldMasterIdLst>
   <p:notesMasterIdLst>
-    <p:notesMasterId r:id="rId7"/>
+    <p:notesMasterId r:id="rId8"/>
   </p:notesMasterIdLst>
   <p:sldIdLst>
     <p:sldId id="267" r:id="rId2"/>
@@ -13,6 +13,7 @@
     <p:sldId id="275" r:id="rId4"/>
     <p:sldId id="272" r:id="rId5"/>
     <p:sldId id="268" r:id="rId6"/>
+    <p:sldId id="276" r:id="rId7"/>
   </p:sldIdLst>
   <p:sldSz cx="9144000" cy="6858000" type="screen4x3"/>
   <p:notesSz cx="6858000" cy="9144000"/>
@@ -4213,6 +4214,98 @@
       </p:par>
     </p:tnLst>
   </p:timing>
+</p:sld>
+</file>
+
+<file path=ppt/slides/slide6.xml><?xml version="1.0" encoding="utf-8"?>
+<p:sld xmlns:a="http://schemas.openxmlformats.org/drawingml/2006/main" xmlns:r="http://schemas.openxmlformats.org/officeDocument/2006/relationships" xmlns:p="http://schemas.openxmlformats.org/presentationml/2006/main">
+  <p:cSld>
+    <p:spTree>
+      <p:nvGrpSpPr>
+        <p:cNvPr id="1" name=""/>
+        <p:cNvGrpSpPr/>
+        <p:nvPr/>
+      </p:nvGrpSpPr>
+      <p:grpSpPr>
+        <a:xfrm>
+          <a:off x="0" y="0"/>
+          <a:ext cx="0" cy="0"/>
+          <a:chOff x="0" y="0"/>
+          <a:chExt cx="0" cy="0"/>
+        </a:xfrm>
+      </p:grpSpPr>
+      <p:sp>
+        <p:nvSpPr>
+          <p:cNvPr id="2" name="Title 1"/>
+          <p:cNvSpPr>
+            <a:spLocks noGrp="1"/>
+          </p:cNvSpPr>
+          <p:nvPr>
+            <p:ph type="title"/>
+          </p:nvPr>
+        </p:nvSpPr>
+        <p:spPr/>
+        <p:txBody>
+          <a:bodyPr/>
+          <a:lstStyle/>
+          <a:p>
+            <a:endParaRPr lang="en-GB"/>
+          </a:p>
+        </p:txBody>
+      </p:sp>
+      <p:sp>
+        <p:nvSpPr>
+          <p:cNvPr id="3" name="Content Placeholder 2"/>
+          <p:cNvSpPr>
+            <a:spLocks noGrp="1"/>
+          </p:cNvSpPr>
+          <p:nvPr>
+            <p:ph idx="1"/>
+          </p:nvPr>
+        </p:nvSpPr>
+        <p:spPr/>
+        <p:txBody>
+          <a:bodyPr/>
+          <a:lstStyle/>
+          <a:p>
+            <a:endParaRPr lang="en-GB"/>
+          </a:p>
+        </p:txBody>
+      </p:sp>
+      <p:pic>
+        <p:nvPicPr>
+          <p:cNvPr id="4" name="Picture 3"/>
+          <p:cNvPicPr>
+            <a:picLocks noChangeAspect="1"/>
+          </p:cNvPicPr>
+          <p:nvPr/>
+        </p:nvPicPr>
+        <p:blipFill>
+          <a:blip r:embed="rId2"/>
+          <a:stretch>
+            <a:fillRect/>
+          </a:stretch>
+        </p:blipFill>
+        <p:spPr>
+          <a:xfrm>
+            <a:off x="685800" y="309639"/>
+            <a:ext cx="7924800" cy="6511545"/>
+          </a:xfrm>
+          <a:prstGeom prst="rect">
+            <a:avLst/>
+          </a:prstGeom>
+        </p:spPr>
+      </p:pic>
+    </p:spTree>
+    <p:extLst>
+      <p:ext uri="{BB962C8B-B14F-4D97-AF65-F5344CB8AC3E}">
+        <p14:creationId xmlns:p14="http://schemas.microsoft.com/office/powerpoint/2010/main" val="2143275608"/>
+      </p:ext>
+    </p:extLst>
+  </p:cSld>
+  <p:clrMapOvr>
+    <a:masterClrMapping/>
+  </p:clrMapOvr>
 </p:sld>
 </file>
 

</xml_diff>